<commit_message>
Change presentation display mode
Ensure presentation doesn't to full-screen.
</commit_message>
<xml_diff>
--- a/python_dashboards.pptx
+++ b/python_dashboards.pptx
@@ -269,7 +269,7 @@
           <a:p>
             <a:fld id="{CE92E3B1-01F2-49CF-99E4-33D1FD180D62}" type="datetimeFigureOut">
               <a:rPr lang="LID4096" smtClean="0"/>
-              <a:t>12/20/2022</a:t>
+              <a:t>04/10/2024</a:t>
             </a:fld>
             <a:endParaRPr lang="LID4096"/>
           </a:p>
@@ -469,7 +469,7 @@
           <a:p>
             <a:fld id="{CE92E3B1-01F2-49CF-99E4-33D1FD180D62}" type="datetimeFigureOut">
               <a:rPr lang="LID4096" smtClean="0"/>
-              <a:t>12/20/2022</a:t>
+              <a:t>04/10/2024</a:t>
             </a:fld>
             <a:endParaRPr lang="LID4096"/>
           </a:p>
@@ -679,7 +679,7 @@
           <a:p>
             <a:fld id="{CE92E3B1-01F2-49CF-99E4-33D1FD180D62}" type="datetimeFigureOut">
               <a:rPr lang="LID4096" smtClean="0"/>
-              <a:t>12/20/2022</a:t>
+              <a:t>04/10/2024</a:t>
             </a:fld>
             <a:endParaRPr lang="LID4096"/>
           </a:p>
@@ -879,7 +879,7 @@
           <a:p>
             <a:fld id="{CE92E3B1-01F2-49CF-99E4-33D1FD180D62}" type="datetimeFigureOut">
               <a:rPr lang="LID4096" smtClean="0"/>
-              <a:t>12/20/2022</a:t>
+              <a:t>04/10/2024</a:t>
             </a:fld>
             <a:endParaRPr lang="LID4096"/>
           </a:p>
@@ -1155,7 +1155,7 @@
           <a:p>
             <a:fld id="{CE92E3B1-01F2-49CF-99E4-33D1FD180D62}" type="datetimeFigureOut">
               <a:rPr lang="LID4096" smtClean="0"/>
-              <a:t>12/20/2022</a:t>
+              <a:t>04/10/2024</a:t>
             </a:fld>
             <a:endParaRPr lang="LID4096"/>
           </a:p>
@@ -1423,7 +1423,7 @@
           <a:p>
             <a:fld id="{CE92E3B1-01F2-49CF-99E4-33D1FD180D62}" type="datetimeFigureOut">
               <a:rPr lang="LID4096" smtClean="0"/>
-              <a:t>12/20/2022</a:t>
+              <a:t>04/10/2024</a:t>
             </a:fld>
             <a:endParaRPr lang="LID4096"/>
           </a:p>
@@ -1838,7 +1838,7 @@
           <a:p>
             <a:fld id="{CE92E3B1-01F2-49CF-99E4-33D1FD180D62}" type="datetimeFigureOut">
               <a:rPr lang="LID4096" smtClean="0"/>
-              <a:t>12/20/2022</a:t>
+              <a:t>04/10/2024</a:t>
             </a:fld>
             <a:endParaRPr lang="LID4096"/>
           </a:p>
@@ -1980,7 +1980,7 @@
           <a:p>
             <a:fld id="{CE92E3B1-01F2-49CF-99E4-33D1FD180D62}" type="datetimeFigureOut">
               <a:rPr lang="LID4096" smtClean="0"/>
-              <a:t>12/20/2022</a:t>
+              <a:t>04/10/2024</a:t>
             </a:fld>
             <a:endParaRPr lang="LID4096"/>
           </a:p>
@@ -2093,7 +2093,7 @@
           <a:p>
             <a:fld id="{CE92E3B1-01F2-49CF-99E4-33D1FD180D62}" type="datetimeFigureOut">
               <a:rPr lang="LID4096" smtClean="0"/>
-              <a:t>12/20/2022</a:t>
+              <a:t>04/10/2024</a:t>
             </a:fld>
             <a:endParaRPr lang="LID4096"/>
           </a:p>
@@ -2406,7 +2406,7 @@
           <a:p>
             <a:fld id="{CE92E3B1-01F2-49CF-99E4-33D1FD180D62}" type="datetimeFigureOut">
               <a:rPr lang="LID4096" smtClean="0"/>
-              <a:t>12/20/2022</a:t>
+              <a:t>04/10/2024</a:t>
             </a:fld>
             <a:endParaRPr lang="LID4096"/>
           </a:p>
@@ -2695,7 +2695,7 @@
           <a:p>
             <a:fld id="{CE92E3B1-01F2-49CF-99E4-33D1FD180D62}" type="datetimeFigureOut">
               <a:rPr lang="LID4096" smtClean="0"/>
-              <a:t>12/20/2022</a:t>
+              <a:t>04/10/2024</a:t>
             </a:fld>
             <a:endParaRPr lang="LID4096"/>
           </a:p>
@@ -2938,7 +2938,7 @@
           <a:p>
             <a:fld id="{CE92E3B1-01F2-49CF-99E4-33D1FD180D62}" type="datetimeFigureOut">
               <a:rPr lang="LID4096" smtClean="0"/>
-              <a:t>12/20/2022</a:t>
+              <a:t>04/10/2024</a:t>
             </a:fld>
             <a:endParaRPr lang="LID4096"/>
           </a:p>

</xml_diff>